<commit_message>
Switching function comparison is added
phase is problemetic, the phase of simulations and analytic solution is different
</commit_message>
<xml_diff>
--- a/Reports/IMMD/Parasitic_Model-Simulation.pptx
+++ b/Reports/IMMD/Parasitic_Model-Simulation.pptx
@@ -20,6 +20,12 @@
     <p:sldId id="268" r:id="rId14"/>
     <p:sldId id="269" r:id="rId15"/>
     <p:sldId id="270" r:id="rId16"/>
+    <p:sldId id="271" r:id="rId17"/>
+    <p:sldId id="272" r:id="rId18"/>
+    <p:sldId id="273" r:id="rId19"/>
+    <p:sldId id="274" r:id="rId20"/>
+    <p:sldId id="275" r:id="rId21"/>
+    <p:sldId id="276" r:id="rId22"/>
   </p:sldIdLst>
   <p:sldSz cx="12192000" cy="6858000"/>
   <p:notesSz cx="6858000" cy="9144000"/>
@@ -118,6 +124,11 @@
       </a:defRPr>
     </a:lvl9pPr>
   </p:defaultTextStyle>
+  <p:extLst>
+    <p:ext uri="{EFAFB233-063F-42B5-8137-9DF3F51BA10A}">
+      <p15:sldGuideLst xmlns:p15="http://schemas.microsoft.com/office/powerpoint/2012/main"/>
+    </p:ext>
+  </p:extLst>
 </p:presentation>
 </file>
 
@@ -268,7 +279,7 @@
           <a:p>
             <a:fld id="{ECB20B7B-A201-4959-897A-8400F8B6D164}" type="datetimeFigureOut">
               <a:rPr lang="en-US" smtClean="0"/>
-              <a:t>6/13/2020</a:t>
+              <a:t>6/16/2020</a:t>
             </a:fld>
             <a:endParaRPr lang="en-US"/>
           </a:p>
@@ -466,7 +477,7 @@
           <a:p>
             <a:fld id="{ECB20B7B-A201-4959-897A-8400F8B6D164}" type="datetimeFigureOut">
               <a:rPr lang="en-US" smtClean="0"/>
-              <a:t>6/13/2020</a:t>
+              <a:t>6/16/2020</a:t>
             </a:fld>
             <a:endParaRPr lang="en-US"/>
           </a:p>
@@ -674,7 +685,7 @@
           <a:p>
             <a:fld id="{ECB20B7B-A201-4959-897A-8400F8B6D164}" type="datetimeFigureOut">
               <a:rPr lang="en-US" smtClean="0"/>
-              <a:t>6/13/2020</a:t>
+              <a:t>6/16/2020</a:t>
             </a:fld>
             <a:endParaRPr lang="en-US"/>
           </a:p>
@@ -872,7 +883,7 @@
           <a:p>
             <a:fld id="{ECB20B7B-A201-4959-897A-8400F8B6D164}" type="datetimeFigureOut">
               <a:rPr lang="en-US" smtClean="0"/>
-              <a:t>6/13/2020</a:t>
+              <a:t>6/16/2020</a:t>
             </a:fld>
             <a:endParaRPr lang="en-US"/>
           </a:p>
@@ -1147,7 +1158,7 @@
           <a:p>
             <a:fld id="{ECB20B7B-A201-4959-897A-8400F8B6D164}" type="datetimeFigureOut">
               <a:rPr lang="en-US" smtClean="0"/>
-              <a:t>6/13/2020</a:t>
+              <a:t>6/16/2020</a:t>
             </a:fld>
             <a:endParaRPr lang="en-US"/>
           </a:p>
@@ -1412,7 +1423,7 @@
           <a:p>
             <a:fld id="{ECB20B7B-A201-4959-897A-8400F8B6D164}" type="datetimeFigureOut">
               <a:rPr lang="en-US" smtClean="0"/>
-              <a:t>6/13/2020</a:t>
+              <a:t>6/16/2020</a:t>
             </a:fld>
             <a:endParaRPr lang="en-US"/>
           </a:p>
@@ -1824,7 +1835,7 @@
           <a:p>
             <a:fld id="{ECB20B7B-A201-4959-897A-8400F8B6D164}" type="datetimeFigureOut">
               <a:rPr lang="en-US" smtClean="0"/>
-              <a:t>6/13/2020</a:t>
+              <a:t>6/16/2020</a:t>
             </a:fld>
             <a:endParaRPr lang="en-US"/>
           </a:p>
@@ -1965,7 +1976,7 @@
           <a:p>
             <a:fld id="{ECB20B7B-A201-4959-897A-8400F8B6D164}" type="datetimeFigureOut">
               <a:rPr lang="en-US" smtClean="0"/>
-              <a:t>6/13/2020</a:t>
+              <a:t>6/16/2020</a:t>
             </a:fld>
             <a:endParaRPr lang="en-US"/>
           </a:p>
@@ -2078,7 +2089,7 @@
           <a:p>
             <a:fld id="{ECB20B7B-A201-4959-897A-8400F8B6D164}" type="datetimeFigureOut">
               <a:rPr lang="en-US" smtClean="0"/>
-              <a:t>6/13/2020</a:t>
+              <a:t>6/16/2020</a:t>
             </a:fld>
             <a:endParaRPr lang="en-US"/>
           </a:p>
@@ -2389,7 +2400,7 @@
           <a:p>
             <a:fld id="{ECB20B7B-A201-4959-897A-8400F8B6D164}" type="datetimeFigureOut">
               <a:rPr lang="en-US" smtClean="0"/>
-              <a:t>6/13/2020</a:t>
+              <a:t>6/16/2020</a:t>
             </a:fld>
             <a:endParaRPr lang="en-US"/>
           </a:p>
@@ -2677,7 +2688,7 @@
           <a:p>
             <a:fld id="{ECB20B7B-A201-4959-897A-8400F8B6D164}" type="datetimeFigureOut">
               <a:rPr lang="en-US" smtClean="0"/>
-              <a:t>6/13/2020</a:t>
+              <a:t>6/16/2020</a:t>
             </a:fld>
             <a:endParaRPr lang="en-US"/>
           </a:p>
@@ -2918,7 +2929,7 @@
           <a:p>
             <a:fld id="{ECB20B7B-A201-4959-897A-8400F8B6D164}" type="datetimeFigureOut">
               <a:rPr lang="en-US" smtClean="0"/>
-              <a:t>6/13/2020</a:t>
+              <a:t>6/16/2020</a:t>
             </a:fld>
             <a:endParaRPr lang="en-US"/>
           </a:p>
@@ -3335,8 +3346,8 @@
           <a:chExt cx="0" cy="0"/>
         </a:xfrm>
       </p:grpSpPr>
-      <mc:AlternateContent xmlns:mc="http://schemas.openxmlformats.org/markup-compatibility/2006">
-        <mc:Choice xmlns:a14="http://schemas.microsoft.com/office/drawing/2010/main" Requires="a14">
+      <mc:AlternateContent xmlns:mc="http://schemas.openxmlformats.org/markup-compatibility/2006" xmlns:a14="http://schemas.microsoft.com/office/drawing/2010/main">
+        <mc:Choice Requires="a14">
           <p:sp>
             <p:nvSpPr>
               <p:cNvPr id="5" name="TextBox 4">
@@ -3569,7 +3580,7 @@
             </p:txBody>
           </p:sp>
         </mc:Choice>
-        <mc:Fallback>
+        <mc:Fallback xmlns="">
           <p:sp>
             <p:nvSpPr>
               <p:cNvPr id="5" name="TextBox 4">
@@ -3614,8 +3625,8 @@
           </p:sp>
         </mc:Fallback>
       </mc:AlternateContent>
-      <mc:AlternateContent xmlns:mc="http://schemas.openxmlformats.org/markup-compatibility/2006">
-        <mc:Choice xmlns:a14="http://schemas.microsoft.com/office/drawing/2010/main" Requires="a14">
+      <mc:AlternateContent xmlns:mc="http://schemas.openxmlformats.org/markup-compatibility/2006" xmlns:a14="http://schemas.microsoft.com/office/drawing/2010/main">
+        <mc:Choice Requires="a14">
           <p:sp>
             <p:nvSpPr>
               <p:cNvPr id="6" name="Content Placeholder 2">
@@ -4075,7 +4086,7 @@
             </p:txBody>
           </p:sp>
         </mc:Choice>
-        <mc:Fallback>
+        <mc:Fallback xmlns="">
           <p:sp>
             <p:nvSpPr>
               <p:cNvPr id="6" name="Content Placeholder 2">
@@ -4390,6 +4401,78 @@
           <a:chExt cx="0" cy="0"/>
         </a:xfrm>
       </p:grpSpPr>
+      <p:sp>
+        <p:nvSpPr>
+          <p:cNvPr id="2" name="TextBox 1">
+            <a:extLst>
+              <a:ext uri="{FF2B5EF4-FFF2-40B4-BE49-F238E27FC236}">
+                <a16:creationId xmlns:a16="http://schemas.microsoft.com/office/drawing/2014/main" id="{9D5E0684-425D-4BFE-8B0F-ED9DC61E2442}"/>
+              </a:ext>
+            </a:extLst>
+          </p:cNvPr>
+          <p:cNvSpPr txBox="1"/>
+          <p:nvPr/>
+        </p:nvSpPr>
+        <p:spPr>
+          <a:xfrm>
+            <a:off x="3040224" y="466531"/>
+            <a:ext cx="7847045" cy="707886"/>
+          </a:xfrm>
+          <a:prstGeom prst="rect">
+            <a:avLst/>
+          </a:prstGeom>
+          <a:noFill/>
+        </p:spPr>
+        <p:txBody>
+          <a:bodyPr wrap="square" rtlCol="0">
+            <a:spAutoFit/>
+          </a:bodyPr>
+          <a:lstStyle/>
+          <a:p>
+            <a:r>
+              <a:rPr lang="tr-TR" sz="4000" dirty="0">
+                <a:latin typeface="Times New Roman" panose="02020603050405020304" pitchFamily="18" charset="0"/>
+                <a:cs typeface="Times New Roman" panose="02020603050405020304" pitchFamily="18" charset="0"/>
+              </a:rPr>
+              <a:t>SWITCHING FUNCTION</a:t>
+            </a:r>
+            <a:endParaRPr lang="en-US" sz="4000" dirty="0">
+              <a:latin typeface="Times New Roman" panose="02020603050405020304" pitchFamily="18" charset="0"/>
+              <a:cs typeface="Times New Roman" panose="02020603050405020304" pitchFamily="18" charset="0"/>
+            </a:endParaRPr>
+          </a:p>
+        </p:txBody>
+      </p:sp>
+      <p:pic>
+        <p:nvPicPr>
+          <p:cNvPr id="4" name="Picture 3">
+            <a:extLst>
+              <a:ext uri="{FF2B5EF4-FFF2-40B4-BE49-F238E27FC236}">
+                <a16:creationId xmlns:a16="http://schemas.microsoft.com/office/drawing/2014/main" id="{79B09DFB-C43C-42C1-B40F-5B0782A9B847}"/>
+              </a:ext>
+            </a:extLst>
+          </p:cNvPr>
+          <p:cNvPicPr>
+            <a:picLocks noChangeAspect="1"/>
+          </p:cNvPicPr>
+          <p:nvPr/>
+        </p:nvPicPr>
+        <p:blipFill>
+          <a:blip r:embed="rId2"/>
+          <a:stretch>
+            <a:fillRect/>
+          </a:stretch>
+        </p:blipFill>
+        <p:spPr>
+          <a:xfrm>
+            <a:off x="1166326" y="1514352"/>
+            <a:ext cx="9859347" cy="5343648"/>
+          </a:xfrm>
+          <a:prstGeom prst="rect">
+            <a:avLst/>
+          </a:prstGeom>
+        </p:spPr>
+      </p:pic>
     </p:spTree>
     <p:extLst>
       <p:ext uri="{BB962C8B-B14F-4D97-AF65-F5344CB8AC3E}">
@@ -4420,10 +4503,280 @@
           <a:chExt cx="0" cy="0"/>
         </a:xfrm>
       </p:grpSpPr>
+      <p:pic>
+        <p:nvPicPr>
+          <p:cNvPr id="2" name="Picture 1">
+            <a:extLst>
+              <a:ext uri="{FF2B5EF4-FFF2-40B4-BE49-F238E27FC236}">
+                <a16:creationId xmlns:a16="http://schemas.microsoft.com/office/drawing/2014/main" id="{8113E984-AB98-4D0F-B883-703A1AF2BC0F}"/>
+              </a:ext>
+            </a:extLst>
+          </p:cNvPr>
+          <p:cNvPicPr>
+            <a:picLocks noChangeAspect="1"/>
+          </p:cNvPicPr>
+          <p:nvPr/>
+        </p:nvPicPr>
+        <p:blipFill>
+          <a:blip r:embed="rId2"/>
+          <a:stretch>
+            <a:fillRect/>
+          </a:stretch>
+        </p:blipFill>
+        <p:spPr>
+          <a:xfrm>
+            <a:off x="299947" y="252382"/>
+            <a:ext cx="11453513" cy="6353236"/>
+          </a:xfrm>
+          <a:prstGeom prst="rect">
+            <a:avLst/>
+          </a:prstGeom>
+        </p:spPr>
+      </p:pic>
     </p:spTree>
     <p:extLst>
       <p:ext uri="{BB962C8B-B14F-4D97-AF65-F5344CB8AC3E}">
         <p14:creationId xmlns:p14="http://schemas.microsoft.com/office/powerpoint/2010/main" val="4201791633"/>
+      </p:ext>
+    </p:extLst>
+  </p:cSld>
+  <p:clrMapOvr>
+    <a:masterClrMapping/>
+  </p:clrMapOvr>
+</p:sld>
+</file>
+
+<file path=ppt/slides/slide16.xml><?xml version="1.0" encoding="utf-8"?>
+<p:sld xmlns:a="http://schemas.openxmlformats.org/drawingml/2006/main" xmlns:r="http://schemas.openxmlformats.org/officeDocument/2006/relationships" xmlns:p="http://schemas.openxmlformats.org/presentationml/2006/main">
+  <p:cSld>
+    <p:spTree>
+      <p:nvGrpSpPr>
+        <p:cNvPr id="1" name=""/>
+        <p:cNvGrpSpPr/>
+        <p:nvPr/>
+      </p:nvGrpSpPr>
+      <p:grpSpPr>
+        <a:xfrm>
+          <a:off x="0" y="0"/>
+          <a:ext cx="0" cy="0"/>
+          <a:chOff x="0" y="0"/>
+          <a:chExt cx="0" cy="0"/>
+        </a:xfrm>
+      </p:grpSpPr>
+      <p:pic>
+        <p:nvPicPr>
+          <p:cNvPr id="4" name="Picture 3">
+            <a:extLst>
+              <a:ext uri="{FF2B5EF4-FFF2-40B4-BE49-F238E27FC236}">
+                <a16:creationId xmlns:a16="http://schemas.microsoft.com/office/drawing/2014/main" id="{0F849871-6130-4456-BFB2-3509BC40D192}"/>
+              </a:ext>
+            </a:extLst>
+          </p:cNvPr>
+          <p:cNvPicPr>
+            <a:picLocks noChangeAspect="1"/>
+          </p:cNvPicPr>
+          <p:nvPr/>
+        </p:nvPicPr>
+        <p:blipFill>
+          <a:blip r:embed="rId2"/>
+          <a:stretch>
+            <a:fillRect/>
+          </a:stretch>
+        </p:blipFill>
+        <p:spPr>
+          <a:xfrm>
+            <a:off x="180642" y="335902"/>
+            <a:ext cx="11619471" cy="6055354"/>
+          </a:xfrm>
+          <a:prstGeom prst="rect">
+            <a:avLst/>
+          </a:prstGeom>
+        </p:spPr>
+      </p:pic>
+    </p:spTree>
+    <p:extLst>
+      <p:ext uri="{BB962C8B-B14F-4D97-AF65-F5344CB8AC3E}">
+        <p14:creationId xmlns:p14="http://schemas.microsoft.com/office/powerpoint/2010/main" val="2585682696"/>
+      </p:ext>
+    </p:extLst>
+  </p:cSld>
+  <p:clrMapOvr>
+    <a:masterClrMapping/>
+  </p:clrMapOvr>
+</p:sld>
+</file>
+
+<file path=ppt/slides/slide17.xml><?xml version="1.0" encoding="utf-8"?>
+<p:sld xmlns:a="http://schemas.openxmlformats.org/drawingml/2006/main" xmlns:r="http://schemas.openxmlformats.org/officeDocument/2006/relationships" xmlns:p="http://schemas.openxmlformats.org/presentationml/2006/main">
+  <p:cSld>
+    <p:spTree>
+      <p:nvGrpSpPr>
+        <p:cNvPr id="1" name=""/>
+        <p:cNvGrpSpPr/>
+        <p:nvPr/>
+      </p:nvGrpSpPr>
+      <p:grpSpPr>
+        <a:xfrm>
+          <a:off x="0" y="0"/>
+          <a:ext cx="0" cy="0"/>
+          <a:chOff x="0" y="0"/>
+          <a:chExt cx="0" cy="0"/>
+        </a:xfrm>
+      </p:grpSpPr>
+      <p:pic>
+        <p:nvPicPr>
+          <p:cNvPr id="2" name="Picture 1">
+            <a:extLst>
+              <a:ext uri="{FF2B5EF4-FFF2-40B4-BE49-F238E27FC236}">
+                <a16:creationId xmlns:a16="http://schemas.microsoft.com/office/drawing/2014/main" id="{722638C9-6E88-4E71-B91B-08D429993353}"/>
+              </a:ext>
+            </a:extLst>
+          </p:cNvPr>
+          <p:cNvPicPr>
+            <a:picLocks noChangeAspect="1"/>
+          </p:cNvPicPr>
+          <p:nvPr/>
+        </p:nvPicPr>
+        <p:blipFill>
+          <a:blip r:embed="rId2"/>
+          <a:stretch>
+            <a:fillRect/>
+          </a:stretch>
+        </p:blipFill>
+        <p:spPr>
+          <a:xfrm>
+            <a:off x="173049" y="419878"/>
+            <a:ext cx="11845901" cy="6237816"/>
+          </a:xfrm>
+          <a:prstGeom prst="rect">
+            <a:avLst/>
+          </a:prstGeom>
+        </p:spPr>
+      </p:pic>
+    </p:spTree>
+    <p:extLst>
+      <p:ext uri="{BB962C8B-B14F-4D97-AF65-F5344CB8AC3E}">
+        <p14:creationId xmlns:p14="http://schemas.microsoft.com/office/powerpoint/2010/main" val="3462268783"/>
+      </p:ext>
+    </p:extLst>
+  </p:cSld>
+  <p:clrMapOvr>
+    <a:masterClrMapping/>
+  </p:clrMapOvr>
+</p:sld>
+</file>
+
+<file path=ppt/slides/slide18.xml><?xml version="1.0" encoding="utf-8"?>
+<p:sld xmlns:a="http://schemas.openxmlformats.org/drawingml/2006/main" xmlns:r="http://schemas.openxmlformats.org/officeDocument/2006/relationships" xmlns:p="http://schemas.openxmlformats.org/presentationml/2006/main">
+  <p:cSld>
+    <p:spTree>
+      <p:nvGrpSpPr>
+        <p:cNvPr id="1" name=""/>
+        <p:cNvGrpSpPr/>
+        <p:nvPr/>
+      </p:nvGrpSpPr>
+      <p:grpSpPr>
+        <a:xfrm>
+          <a:off x="0" y="0"/>
+          <a:ext cx="0" cy="0"/>
+          <a:chOff x="0" y="0"/>
+          <a:chExt cx="0" cy="0"/>
+        </a:xfrm>
+      </p:grpSpPr>
+      <p:pic>
+        <p:nvPicPr>
+          <p:cNvPr id="2" name="Picture 1">
+            <a:extLst>
+              <a:ext uri="{FF2B5EF4-FFF2-40B4-BE49-F238E27FC236}">
+                <a16:creationId xmlns:a16="http://schemas.microsoft.com/office/drawing/2014/main" id="{43659056-A2AA-4343-9BBF-902EFB80666F}"/>
+              </a:ext>
+            </a:extLst>
+          </p:cNvPr>
+          <p:cNvPicPr>
+            <a:picLocks noChangeAspect="1"/>
+          </p:cNvPicPr>
+          <p:nvPr/>
+        </p:nvPicPr>
+        <p:blipFill>
+          <a:blip r:embed="rId2"/>
+          <a:stretch>
+            <a:fillRect/>
+          </a:stretch>
+        </p:blipFill>
+        <p:spPr>
+          <a:xfrm>
+            <a:off x="179467" y="346570"/>
+            <a:ext cx="11667300" cy="6164860"/>
+          </a:xfrm>
+          <a:prstGeom prst="rect">
+            <a:avLst/>
+          </a:prstGeom>
+        </p:spPr>
+      </p:pic>
+    </p:spTree>
+    <p:extLst>
+      <p:ext uri="{BB962C8B-B14F-4D97-AF65-F5344CB8AC3E}">
+        <p14:creationId xmlns:p14="http://schemas.microsoft.com/office/powerpoint/2010/main" val="121364513"/>
+      </p:ext>
+    </p:extLst>
+  </p:cSld>
+  <p:clrMapOvr>
+    <a:masterClrMapping/>
+  </p:clrMapOvr>
+</p:sld>
+</file>
+
+<file path=ppt/slides/slide19.xml><?xml version="1.0" encoding="utf-8"?>
+<p:sld xmlns:a="http://schemas.openxmlformats.org/drawingml/2006/main" xmlns:r="http://schemas.openxmlformats.org/officeDocument/2006/relationships" xmlns:p="http://schemas.openxmlformats.org/presentationml/2006/main">
+  <p:cSld>
+    <p:spTree>
+      <p:nvGrpSpPr>
+        <p:cNvPr id="1" name=""/>
+        <p:cNvGrpSpPr/>
+        <p:nvPr/>
+      </p:nvGrpSpPr>
+      <p:grpSpPr>
+        <a:xfrm>
+          <a:off x="0" y="0"/>
+          <a:ext cx="0" cy="0"/>
+          <a:chOff x="0" y="0"/>
+          <a:chExt cx="0" cy="0"/>
+        </a:xfrm>
+      </p:grpSpPr>
+      <p:pic>
+        <p:nvPicPr>
+          <p:cNvPr id="2" name="Picture 1">
+            <a:extLst>
+              <a:ext uri="{FF2B5EF4-FFF2-40B4-BE49-F238E27FC236}">
+                <a16:creationId xmlns:a16="http://schemas.microsoft.com/office/drawing/2014/main" id="{CF9A388C-6B1B-4853-A9E7-EF07EF36516F}"/>
+              </a:ext>
+            </a:extLst>
+          </p:cNvPr>
+          <p:cNvPicPr>
+            <a:picLocks noChangeAspect="1"/>
+          </p:cNvPicPr>
+          <p:nvPr/>
+        </p:nvPicPr>
+        <p:blipFill>
+          <a:blip r:embed="rId2"/>
+          <a:stretch>
+            <a:fillRect/>
+          </a:stretch>
+        </p:blipFill>
+        <p:spPr>
+          <a:xfrm>
+            <a:off x="568573" y="709126"/>
+            <a:ext cx="11224049" cy="5687646"/>
+          </a:xfrm>
+          <a:prstGeom prst="rect">
+            <a:avLst/>
+          </a:prstGeom>
+        </p:spPr>
+      </p:pic>
+    </p:spTree>
+    <p:extLst>
+      <p:ext uri="{BB962C8B-B14F-4D97-AF65-F5344CB8AC3E}">
+        <p14:creationId xmlns:p14="http://schemas.microsoft.com/office/powerpoint/2010/main" val="4150009455"/>
       </p:ext>
     </p:extLst>
   </p:cSld>
@@ -4581,8 +4934,8 @@
           </a:p>
         </p:txBody>
       </p:sp>
-      <mc:AlternateContent xmlns:mc="http://schemas.openxmlformats.org/markup-compatibility/2006">
-        <mc:Choice xmlns:a14="http://schemas.microsoft.com/office/drawing/2010/main" Requires="a14">
+      <mc:AlternateContent xmlns:mc="http://schemas.openxmlformats.org/markup-compatibility/2006" xmlns:a14="http://schemas.microsoft.com/office/drawing/2010/main">
+        <mc:Choice Requires="a14">
           <p:sp>
             <p:nvSpPr>
               <p:cNvPr id="3" name="Content Placeholder 2">
@@ -4918,7 +5271,7 @@
             </p:txBody>
           </p:sp>
         </mc:Choice>
-        <mc:Fallback>
+        <mc:Fallback xmlns="">
           <p:sp>
             <p:nvSpPr>
               <p:cNvPr id="3" name="Content Placeholder 2">
@@ -4963,8 +5316,8 @@
           </p:sp>
         </mc:Fallback>
       </mc:AlternateContent>
-      <mc:AlternateContent xmlns:mc="http://schemas.openxmlformats.org/markup-compatibility/2006">
-        <mc:Choice xmlns:a14="http://schemas.microsoft.com/office/drawing/2010/main" Requires="a14">
+      <mc:AlternateContent xmlns:mc="http://schemas.openxmlformats.org/markup-compatibility/2006" xmlns:a14="http://schemas.microsoft.com/office/drawing/2010/main">
+        <mc:Choice Requires="a14">
           <p:sp>
             <p:nvSpPr>
               <p:cNvPr id="4" name="Rectangle 3">
@@ -5093,7 +5446,7 @@
             </p:txBody>
           </p:sp>
         </mc:Choice>
-        <mc:Fallback>
+        <mc:Fallback xmlns="">
           <p:sp>
             <p:nvSpPr>
               <p:cNvPr id="4" name="Rectangle 3">
@@ -5138,8 +5491,8 @@
           </p:sp>
         </mc:Fallback>
       </mc:AlternateContent>
-      <mc:AlternateContent xmlns:mc="http://schemas.openxmlformats.org/markup-compatibility/2006">
-        <mc:Choice xmlns:a14="http://schemas.microsoft.com/office/drawing/2010/main" Requires="a14">
+      <mc:AlternateContent xmlns:mc="http://schemas.openxmlformats.org/markup-compatibility/2006" xmlns:a14="http://schemas.microsoft.com/office/drawing/2010/main">
+        <mc:Choice Requires="a14">
           <p:sp>
             <p:nvSpPr>
               <p:cNvPr id="6" name="Rectangle 5">
@@ -5537,7 +5890,7 @@
                     <m:sSub>
                       <m:sSubPr>
                         <m:ctrlPr>
-                          <a:rPr lang="tr-TR" b="0" i="0" smtClean="0">
+                          <a:rPr lang="tr-TR" b="0" i="1" smtClean="0">
                             <a:latin typeface="Cambria Math" panose="02040503050406030204" pitchFamily="18" charset="0"/>
                           </a:rPr>
                         </m:ctrlPr>
@@ -5613,7 +5966,7 @@
                     <m:sSub>
                       <m:sSubPr>
                         <m:ctrlPr>
-                          <a:rPr lang="tr-TR" b="0" i="0" smtClean="0">
+                          <a:rPr lang="tr-TR" b="0" i="1" smtClean="0">
                             <a:latin typeface="Cambria Math" panose="02040503050406030204" pitchFamily="18" charset="0"/>
                           </a:rPr>
                         </m:ctrlPr>
@@ -5688,7 +6041,7 @@
             </p:txBody>
           </p:sp>
         </mc:Choice>
-        <mc:Fallback>
+        <mc:Fallback xmlns="">
           <p:sp>
             <p:nvSpPr>
               <p:cNvPr id="6" name="Rectangle 5">
@@ -5737,6 +6090,66 @@
     <p:extLst>
       <p:ext uri="{BB962C8B-B14F-4D97-AF65-F5344CB8AC3E}">
         <p14:creationId xmlns:p14="http://schemas.microsoft.com/office/powerpoint/2010/main" val="1017582742"/>
+      </p:ext>
+    </p:extLst>
+  </p:cSld>
+  <p:clrMapOvr>
+    <a:masterClrMapping/>
+  </p:clrMapOvr>
+</p:sld>
+</file>
+
+<file path=ppt/slides/slide20.xml><?xml version="1.0" encoding="utf-8"?>
+<p:sld xmlns:a="http://schemas.openxmlformats.org/drawingml/2006/main" xmlns:r="http://schemas.openxmlformats.org/officeDocument/2006/relationships" xmlns:p="http://schemas.openxmlformats.org/presentationml/2006/main">
+  <p:cSld>
+    <p:spTree>
+      <p:nvGrpSpPr>
+        <p:cNvPr id="1" name=""/>
+        <p:cNvGrpSpPr/>
+        <p:nvPr/>
+      </p:nvGrpSpPr>
+      <p:grpSpPr>
+        <a:xfrm>
+          <a:off x="0" y="0"/>
+          <a:ext cx="0" cy="0"/>
+          <a:chOff x="0" y="0"/>
+          <a:chExt cx="0" cy="0"/>
+        </a:xfrm>
+      </p:grpSpPr>
+    </p:spTree>
+    <p:extLst>
+      <p:ext uri="{BB962C8B-B14F-4D97-AF65-F5344CB8AC3E}">
+        <p14:creationId xmlns:p14="http://schemas.microsoft.com/office/powerpoint/2010/main" val="2916064740"/>
+      </p:ext>
+    </p:extLst>
+  </p:cSld>
+  <p:clrMapOvr>
+    <a:masterClrMapping/>
+  </p:clrMapOvr>
+</p:sld>
+</file>
+
+<file path=ppt/slides/slide21.xml><?xml version="1.0" encoding="utf-8"?>
+<p:sld xmlns:a="http://schemas.openxmlformats.org/drawingml/2006/main" xmlns:r="http://schemas.openxmlformats.org/officeDocument/2006/relationships" xmlns:p="http://schemas.openxmlformats.org/presentationml/2006/main">
+  <p:cSld>
+    <p:spTree>
+      <p:nvGrpSpPr>
+        <p:cNvPr id="1" name=""/>
+        <p:cNvGrpSpPr/>
+        <p:nvPr/>
+      </p:nvGrpSpPr>
+      <p:grpSpPr>
+        <a:xfrm>
+          <a:off x="0" y="0"/>
+          <a:ext cx="0" cy="0"/>
+          <a:chOff x="0" y="0"/>
+          <a:chExt cx="0" cy="0"/>
+        </a:xfrm>
+      </p:grpSpPr>
+    </p:spTree>
+    <p:extLst>
+      <p:ext uri="{BB962C8B-B14F-4D97-AF65-F5344CB8AC3E}">
+        <p14:creationId xmlns:p14="http://schemas.microsoft.com/office/powerpoint/2010/main" val="23161241"/>
       </p:ext>
     </p:extLst>
   </p:cSld>

</xml_diff>